<commit_message>
Add presentation 3 "Device Drivers Concepts"
</commit_message>
<xml_diff>
--- a/2_source_code_and_dev_tools.pptx
+++ b/2_source_code_and_dev_tools.pptx
@@ -8062,7 +8062,7 @@
         <p:spPr>
           <a:xfrm>
             <a:off x="365760" y="1835280"/>
-            <a:ext cx="8418051" cy="5444267"/>
+            <a:ext cx="8661836" cy="5444267"/>
           </a:xfrm>
           <a:prstGeom prst="rect">
             <a:avLst/>
@@ -8211,7 +8211,29 @@
                 <a:ea typeface="Droid Sans Fallback" pitchFamily="2"/>
                 <a:cs typeface="Lohit Hindi" pitchFamily="2"/>
               </a:rPr>
-              <a:t>If cross-compiling from Linux do not set environmental variables on system level.</a:t>
+              <a:t>If cross-compiling from Linux </a:t>
+            </a:r>
+            <a:r>
+              <a:rPr lang="en-US" sz="1800" b="0" i="0" u="none" strike="noStrike" kern="1200" dirty="0" smtClean="0">
+                <a:ln>
+                  <a:noFill/>
+                </a:ln>
+                <a:latin typeface="Arial" pitchFamily="18"/>
+                <a:ea typeface="Droid Sans Fallback" pitchFamily="2"/>
+                <a:cs typeface="Lohit Hindi" pitchFamily="2"/>
+              </a:rPr>
+              <a:t>does </a:t>
+            </a:r>
+            <a:r>
+              <a:rPr lang="en-US" sz="1800" b="0" i="0" u="none" strike="noStrike" kern="1200" dirty="0" smtClean="0">
+                <a:ln>
+                  <a:noFill/>
+                </a:ln>
+                <a:latin typeface="Arial" pitchFamily="18"/>
+                <a:ea typeface="Droid Sans Fallback" pitchFamily="2"/>
+                <a:cs typeface="Lohit Hindi" pitchFamily="2"/>
+              </a:rPr>
+              <a:t>not set environmental variables on system level.</a:t>
             </a:r>
           </a:p>
           <a:p>
@@ -21073,16 +21095,7 @@
                 <a:cs typeface="Lohit Hindi" pitchFamily="2"/>
                 <a:hlinkClick r:id="rId3"/>
               </a:rPr>
-              <a:t>https://</a:t>
-            </a:r>
-            <a:r>
-              <a:rPr lang="en-US" b="1" dirty="0" smtClean="0">
-                <a:latin typeface="Arial" pitchFamily="18"/>
-                <a:ea typeface="Droid Sans Fallback" pitchFamily="2"/>
-                <a:cs typeface="Lohit Hindi" pitchFamily="2"/>
-                <a:hlinkClick r:id="rId3"/>
-              </a:rPr>
-              <a:t>wiki.openwrt.org/toh/tp-link/tl-mr3020</a:t>
+              <a:t>https://wiki.openwrt.org/toh/tp-link/tl-mr3020</a:t>
             </a:r>
             <a:endParaRPr lang="en-US" b="1" dirty="0" smtClean="0">
               <a:latin typeface="Arial" pitchFamily="18"/>
@@ -21127,16 +21140,7 @@
                 <a:cs typeface="Lohit Hindi" pitchFamily="2"/>
                 <a:hlinkClick r:id="rId4"/>
               </a:rPr>
-              <a:t>https://</a:t>
-            </a:r>
-            <a:r>
-              <a:rPr lang="en-US" b="1" dirty="0" smtClean="0">
-                <a:latin typeface="Arial" pitchFamily="18"/>
-                <a:ea typeface="Droid Sans Fallback" pitchFamily="2"/>
-                <a:cs typeface="Lohit Hindi" pitchFamily="2"/>
-                <a:hlinkClick r:id="rId4"/>
-              </a:rPr>
-              <a:t>github.com/duxing2007/ldd3-examples-3.x</a:t>
+              <a:t>https://github.com/duxing2007/ldd3-examples-3.x</a:t>
             </a:r>
             <a:endParaRPr lang="en-US" b="1" dirty="0" smtClean="0">
               <a:latin typeface="Arial" pitchFamily="18"/>
@@ -21197,18 +21201,7 @@
                 <a:ea typeface="Droid Sans Fallback" pitchFamily="2"/>
                 <a:cs typeface="Lohit Hindi" pitchFamily="2"/>
               </a:rPr>
-              <a:t>’s </a:t>
-            </a:r>
-            <a:r>
-              <a:rPr lang="en-US" sz="1800" b="1" i="0" u="none" strike="noStrike" kern="1200" dirty="0" smtClean="0">
-                <a:ln>
-                  <a:noFill/>
-                </a:ln>
-                <a:latin typeface="Arial" pitchFamily="18"/>
-                <a:ea typeface="Droid Sans Fallback" pitchFamily="2"/>
-                <a:cs typeface="Lohit Hindi" pitchFamily="2"/>
-              </a:rPr>
-              <a:t>kernel drivers directory “</a:t>
+              <a:t>’s kernel drivers directory “</a:t>
             </a:r>
             <a:r>
               <a:rPr lang="en-US" b="1" dirty="0" err="1" smtClean="0">

</xml_diff>